<commit_message>
Adding changes from local
</commit_message>
<xml_diff>
--- a/GitHub & Jenkins.pptx
+++ b/GitHub & Jenkins.pptx
@@ -18,6 +18,7 @@
     <p:sldId id="266" r:id="rId12"/>
     <p:sldId id="267" r:id="rId13"/>
     <p:sldId id="268" r:id="rId14"/>
+    <p:sldId id="269" r:id="rId15"/>
   </p:sldIdLst>
   <p:sldSz cx="12192000" cy="6858000"/>
   <p:notesSz cx="6858000" cy="9144000"/>
@@ -255,7 +256,7 @@
           <a:p>
             <a:fld id="{5E806033-7E64-46B4-B977-E5D0DAFF3BE1}" type="datetimeFigureOut">
               <a:rPr lang="en-IN" smtClean="0"/>
-              <a:t>15-05-2025</a:t>
+              <a:t>17-05-2025</a:t>
             </a:fld>
             <a:endParaRPr lang="en-IN"/>
           </a:p>
@@ -425,7 +426,7 @@
           <a:p>
             <a:fld id="{5E806033-7E64-46B4-B977-E5D0DAFF3BE1}" type="datetimeFigureOut">
               <a:rPr lang="en-IN" smtClean="0"/>
-              <a:t>15-05-2025</a:t>
+              <a:t>17-05-2025</a:t>
             </a:fld>
             <a:endParaRPr lang="en-IN"/>
           </a:p>
@@ -605,7 +606,7 @@
           <a:p>
             <a:fld id="{5E806033-7E64-46B4-B977-E5D0DAFF3BE1}" type="datetimeFigureOut">
               <a:rPr lang="en-IN" smtClean="0"/>
-              <a:t>15-05-2025</a:t>
+              <a:t>17-05-2025</a:t>
             </a:fld>
             <a:endParaRPr lang="en-IN"/>
           </a:p>
@@ -775,7 +776,7 @@
           <a:p>
             <a:fld id="{5E806033-7E64-46B4-B977-E5D0DAFF3BE1}" type="datetimeFigureOut">
               <a:rPr lang="en-IN" smtClean="0"/>
-              <a:t>15-05-2025</a:t>
+              <a:t>17-05-2025</a:t>
             </a:fld>
             <a:endParaRPr lang="en-IN"/>
           </a:p>
@@ -1021,7 +1022,7 @@
           <a:p>
             <a:fld id="{5E806033-7E64-46B4-B977-E5D0DAFF3BE1}" type="datetimeFigureOut">
               <a:rPr lang="en-IN" smtClean="0"/>
-              <a:t>15-05-2025</a:t>
+              <a:t>17-05-2025</a:t>
             </a:fld>
             <a:endParaRPr lang="en-IN"/>
           </a:p>
@@ -1253,7 +1254,7 @@
           <a:p>
             <a:fld id="{5E806033-7E64-46B4-B977-E5D0DAFF3BE1}" type="datetimeFigureOut">
               <a:rPr lang="en-IN" smtClean="0"/>
-              <a:t>15-05-2025</a:t>
+              <a:t>17-05-2025</a:t>
             </a:fld>
             <a:endParaRPr lang="en-IN"/>
           </a:p>
@@ -1620,7 +1621,7 @@
           <a:p>
             <a:fld id="{5E806033-7E64-46B4-B977-E5D0DAFF3BE1}" type="datetimeFigureOut">
               <a:rPr lang="en-IN" smtClean="0"/>
-              <a:t>15-05-2025</a:t>
+              <a:t>17-05-2025</a:t>
             </a:fld>
             <a:endParaRPr lang="en-IN"/>
           </a:p>
@@ -1738,7 +1739,7 @@
           <a:p>
             <a:fld id="{5E806033-7E64-46B4-B977-E5D0DAFF3BE1}" type="datetimeFigureOut">
               <a:rPr lang="en-IN" smtClean="0"/>
-              <a:t>15-05-2025</a:t>
+              <a:t>17-05-2025</a:t>
             </a:fld>
             <a:endParaRPr lang="en-IN"/>
           </a:p>
@@ -1833,7 +1834,7 @@
           <a:p>
             <a:fld id="{5E806033-7E64-46B4-B977-E5D0DAFF3BE1}" type="datetimeFigureOut">
               <a:rPr lang="en-IN" smtClean="0"/>
-              <a:t>15-05-2025</a:t>
+              <a:t>17-05-2025</a:t>
             </a:fld>
             <a:endParaRPr lang="en-IN"/>
           </a:p>
@@ -2110,7 +2111,7 @@
           <a:p>
             <a:fld id="{5E806033-7E64-46B4-B977-E5D0DAFF3BE1}" type="datetimeFigureOut">
               <a:rPr lang="en-IN" smtClean="0"/>
-              <a:t>15-05-2025</a:t>
+              <a:t>17-05-2025</a:t>
             </a:fld>
             <a:endParaRPr lang="en-IN"/>
           </a:p>
@@ -2363,7 +2364,7 @@
           <a:p>
             <a:fld id="{5E806033-7E64-46B4-B977-E5D0DAFF3BE1}" type="datetimeFigureOut">
               <a:rPr lang="en-IN" smtClean="0"/>
-              <a:t>15-05-2025</a:t>
+              <a:t>17-05-2025</a:t>
             </a:fld>
             <a:endParaRPr lang="en-IN"/>
           </a:p>
@@ -2576,7 +2577,7 @@
           <a:p>
             <a:fld id="{5E806033-7E64-46B4-B977-E5D0DAFF3BE1}" type="datetimeFigureOut">
               <a:rPr lang="en-IN" smtClean="0"/>
-              <a:t>15-05-2025</a:t>
+              <a:t>17-05-2025</a:t>
             </a:fld>
             <a:endParaRPr lang="en-IN"/>
           </a:p>
@@ -3125,11 +3126,7 @@
             <a:pPr algn="ctr"/>
             <a:r>
               <a:rPr lang="en-US" dirty="0" smtClean="0"/>
-              <a:t>(Server</a:t>
-            </a:r>
-            <a:r>
-              <a:rPr lang="en-US" dirty="0" smtClean="0"/>
-              <a:t>)</a:t>
+              <a:t>(Server)</a:t>
             </a:r>
           </a:p>
           <a:p>
@@ -4902,11 +4899,7 @@
             </a:r>
             <a:r>
               <a:rPr lang="en-IN" dirty="0" smtClean="0"/>
-              <a:t>--</a:t>
-            </a:r>
-            <a:r>
-              <a:rPr lang="en-IN" dirty="0" smtClean="0"/>
-              <a:t>a </a:t>
+              <a:t>--a </a:t>
             </a:r>
             <a:r>
               <a:rPr lang="en-IN" dirty="0" smtClean="0">
@@ -4951,6 +4944,285 @@
     <p:extLst>
       <p:ext uri="{BB962C8B-B14F-4D97-AF65-F5344CB8AC3E}">
         <p14:creationId xmlns:p14="http://schemas.microsoft.com/office/powerpoint/2010/main" val="381871224"/>
+      </p:ext>
+    </p:extLst>
+  </p:cSld>
+  <p:clrMapOvr>
+    <a:masterClrMapping/>
+  </p:clrMapOvr>
+</p:sld>
+</file>
+
+<file path=ppt/slides/slide14.xml><?xml version="1.0" encoding="utf-8"?>
+<p:sld xmlns:a="http://schemas.openxmlformats.org/drawingml/2006/main" xmlns:r="http://schemas.openxmlformats.org/officeDocument/2006/relationships" xmlns:p="http://schemas.openxmlformats.org/presentationml/2006/main">
+  <p:cSld>
+    <p:spTree>
+      <p:nvGrpSpPr>
+        <p:cNvPr id="1" name=""/>
+        <p:cNvGrpSpPr/>
+        <p:nvPr/>
+      </p:nvGrpSpPr>
+      <p:grpSpPr>
+        <a:xfrm>
+          <a:off x="0" y="0"/>
+          <a:ext cx="0" cy="0"/>
+          <a:chOff x="0" y="0"/>
+          <a:chExt cx="0" cy="0"/>
+        </a:xfrm>
+      </p:grpSpPr>
+      <p:sp>
+        <p:nvSpPr>
+          <p:cNvPr id="4" name="TextBox 3"/>
+          <p:cNvSpPr txBox="1"/>
+          <p:nvPr/>
+        </p:nvSpPr>
+        <p:spPr>
+          <a:xfrm>
+            <a:off x="618186" y="1171977"/>
+            <a:ext cx="2215166" cy="923330"/>
+          </a:xfrm>
+          <a:prstGeom prst="rect">
+            <a:avLst/>
+          </a:prstGeom>
+          <a:noFill/>
+        </p:spPr>
+        <p:txBody>
+          <a:bodyPr wrap="square" rtlCol="0">
+            <a:spAutoFit/>
+          </a:bodyPr>
+          <a:lstStyle/>
+          <a:p>
+            <a:r>
+              <a:rPr lang="en-US" dirty="0" smtClean="0"/>
+              <a:t>Developer 1</a:t>
+            </a:r>
+          </a:p>
+          <a:p>
+            <a:r>
+              <a:rPr lang="en-US" dirty="0" smtClean="0"/>
+              <a:t>Home</a:t>
+            </a:r>
+          </a:p>
+          <a:p>
+            <a:r>
+              <a:rPr lang="en-US" dirty="0" smtClean="0"/>
+              <a:t>Login Page</a:t>
+            </a:r>
+            <a:endParaRPr lang="en-IN" dirty="0"/>
+          </a:p>
+        </p:txBody>
+      </p:sp>
+      <p:sp>
+        <p:nvSpPr>
+          <p:cNvPr id="5" name="TextBox 4"/>
+          <p:cNvSpPr txBox="1"/>
+          <p:nvPr/>
+        </p:nvSpPr>
+        <p:spPr>
+          <a:xfrm>
+            <a:off x="618186" y="3825025"/>
+            <a:ext cx="2215166" cy="369332"/>
+          </a:xfrm>
+          <a:prstGeom prst="rect">
+            <a:avLst/>
+          </a:prstGeom>
+          <a:noFill/>
+        </p:spPr>
+        <p:txBody>
+          <a:bodyPr wrap="square" rtlCol="0">
+            <a:spAutoFit/>
+          </a:bodyPr>
+          <a:lstStyle/>
+          <a:p>
+            <a:r>
+              <a:rPr lang="en-US" dirty="0" smtClean="0"/>
+              <a:t>Developer 2</a:t>
+            </a:r>
+            <a:endParaRPr lang="en-IN" dirty="0"/>
+          </a:p>
+        </p:txBody>
+      </p:sp>
+      <p:sp>
+        <p:nvSpPr>
+          <p:cNvPr id="6" name="TextBox 5"/>
+          <p:cNvSpPr txBox="1"/>
+          <p:nvPr/>
+        </p:nvSpPr>
+        <p:spPr>
+          <a:xfrm>
+            <a:off x="6349284" y="638594"/>
+            <a:ext cx="2240924" cy="923330"/>
+          </a:xfrm>
+          <a:prstGeom prst="rect">
+            <a:avLst/>
+          </a:prstGeom>
+          <a:noFill/>
+        </p:spPr>
+        <p:txBody>
+          <a:bodyPr wrap="square" rtlCol="0">
+            <a:spAutoFit/>
+          </a:bodyPr>
+          <a:lstStyle/>
+          <a:p>
+            <a:r>
+              <a:rPr lang="en-US" dirty="0" smtClean="0">
+                <a:solidFill>
+                  <a:srgbClr val="FF0000"/>
+                </a:solidFill>
+              </a:rPr>
+              <a:t>Login with Email</a:t>
+            </a:r>
+          </a:p>
+          <a:p>
+            <a:r>
+              <a:rPr lang="en-US" dirty="0" smtClean="0"/>
+              <a:t>Login with OTP</a:t>
+            </a:r>
+          </a:p>
+          <a:p>
+            <a:r>
+              <a:rPr lang="en-US" dirty="0" smtClean="0"/>
+              <a:t>Loin with FB / Google</a:t>
+            </a:r>
+          </a:p>
+        </p:txBody>
+      </p:sp>
+      <p:cxnSp>
+        <p:nvCxnSpPr>
+          <p:cNvPr id="8" name="Straight Arrow Connector 7"/>
+          <p:cNvCxnSpPr>
+            <a:stCxn id="4" idx="3"/>
+            <a:endCxn id="6" idx="1"/>
+          </p:cNvCxnSpPr>
+          <p:nvPr/>
+        </p:nvCxnSpPr>
+        <p:spPr>
+          <a:xfrm flipV="1">
+            <a:off x="2833352" y="1100259"/>
+            <a:ext cx="3515932" cy="533383"/>
+          </a:xfrm>
+          <a:prstGeom prst="straightConnector1">
+            <a:avLst/>
+          </a:prstGeom>
+          <a:ln>
+            <a:tailEnd type="triangle"/>
+          </a:ln>
+        </p:spPr>
+        <p:style>
+          <a:lnRef idx="1">
+            <a:schemeClr val="accent1"/>
+          </a:lnRef>
+          <a:fillRef idx="0">
+            <a:schemeClr val="accent1"/>
+          </a:fillRef>
+          <a:effectRef idx="0">
+            <a:schemeClr val="accent1"/>
+          </a:effectRef>
+          <a:fontRef idx="minor">
+            <a:schemeClr val="tx1"/>
+          </a:fontRef>
+        </p:style>
+      </p:cxnSp>
+      <p:sp>
+        <p:nvSpPr>
+          <p:cNvPr id="9" name="TextBox 8"/>
+          <p:cNvSpPr txBox="1"/>
+          <p:nvPr/>
+        </p:nvSpPr>
+        <p:spPr>
+          <a:xfrm>
+            <a:off x="3335628" y="1403797"/>
+            <a:ext cx="636713" cy="369332"/>
+          </a:xfrm>
+          <a:prstGeom prst="rect">
+            <a:avLst/>
+          </a:prstGeom>
+          <a:noFill/>
+        </p:spPr>
+        <p:txBody>
+          <a:bodyPr wrap="none" rtlCol="0">
+            <a:spAutoFit/>
+          </a:bodyPr>
+          <a:lstStyle/>
+          <a:p>
+            <a:r>
+              <a:rPr lang="en-US" dirty="0" smtClean="0"/>
+              <a:t>Push</a:t>
+            </a:r>
+            <a:endParaRPr lang="en-IN" dirty="0"/>
+          </a:p>
+        </p:txBody>
+      </p:sp>
+      <p:cxnSp>
+        <p:nvCxnSpPr>
+          <p:cNvPr id="11" name="Straight Arrow Connector 10"/>
+          <p:cNvCxnSpPr>
+            <a:stCxn id="6" idx="1"/>
+            <a:endCxn id="5" idx="3"/>
+          </p:cNvCxnSpPr>
+          <p:nvPr/>
+        </p:nvCxnSpPr>
+        <p:spPr>
+          <a:xfrm flipH="1">
+            <a:off x="2833352" y="1100259"/>
+            <a:ext cx="3515932" cy="2909432"/>
+          </a:xfrm>
+          <a:prstGeom prst="straightConnector1">
+            <a:avLst/>
+          </a:prstGeom>
+          <a:ln>
+            <a:tailEnd type="triangle"/>
+          </a:ln>
+        </p:spPr>
+        <p:style>
+          <a:lnRef idx="1">
+            <a:schemeClr val="accent1"/>
+          </a:lnRef>
+          <a:fillRef idx="0">
+            <a:schemeClr val="accent1"/>
+          </a:fillRef>
+          <a:effectRef idx="0">
+            <a:schemeClr val="accent1"/>
+          </a:effectRef>
+          <a:fontRef idx="minor">
+            <a:schemeClr val="tx1"/>
+          </a:fontRef>
+        </p:style>
+      </p:cxnSp>
+      <p:sp>
+        <p:nvSpPr>
+          <p:cNvPr id="12" name="TextBox 11"/>
+          <p:cNvSpPr txBox="1"/>
+          <p:nvPr/>
+        </p:nvSpPr>
+        <p:spPr>
+          <a:xfrm>
+            <a:off x="4430332" y="2637000"/>
+            <a:ext cx="530915" cy="369332"/>
+          </a:xfrm>
+          <a:prstGeom prst="rect">
+            <a:avLst/>
+          </a:prstGeom>
+          <a:noFill/>
+        </p:spPr>
+        <p:txBody>
+          <a:bodyPr wrap="none" rtlCol="0">
+            <a:spAutoFit/>
+          </a:bodyPr>
+          <a:lstStyle/>
+          <a:p>
+            <a:r>
+              <a:rPr lang="en-US" dirty="0" smtClean="0"/>
+              <a:t>Pull</a:t>
+            </a:r>
+            <a:endParaRPr lang="en-IN" dirty="0"/>
+          </a:p>
+        </p:txBody>
+      </p:sp>
+    </p:spTree>
+    <p:extLst>
+      <p:ext uri="{BB962C8B-B14F-4D97-AF65-F5344CB8AC3E}">
+        <p14:creationId xmlns:p14="http://schemas.microsoft.com/office/powerpoint/2010/main" val="334265962"/>
       </p:ext>
     </p:extLst>
   </p:cSld>

</xml_diff>